<commit_message>
Fixing CaO norm, running a "lowest" submodel
</commit_message>
<xml_diff>
--- a/ChemCam PLS1 Sub-Model Calibration.pptx
+++ b/ChemCam PLS1 Sub-Model Calibration.pptx
@@ -10,6 +10,10 @@
     <p:sldId id="258" r:id="rId4"/>
     <p:sldId id="260" r:id="rId5"/>
     <p:sldId id="259" r:id="rId6"/>
+    <p:sldId id="261" r:id="rId7"/>
+    <p:sldId id="262" r:id="rId8"/>
+    <p:sldId id="263" r:id="rId9"/>
+    <p:sldId id="264" r:id="rId10"/>
   </p:sldIdLst>
   <p:sldSz cx="9144000" cy="6858000" type="screen4x3"/>
   <p:notesSz cx="6858000" cy="9144000"/>
@@ -292,7 +296,7 @@
           <a:p>
             <a:fld id="{9B727278-6BFB-4D36-A720-4ACC06741D38}" type="datetimeFigureOut">
               <a:rPr lang="en-US" smtClean="0"/>
-              <a:t>2/1/2015</a:t>
+              <a:t>2/3/2015</a:t>
             </a:fld>
             <a:endParaRPr lang="en-US"/>
           </a:p>
@@ -462,7 +466,7 @@
           <a:p>
             <a:fld id="{9B727278-6BFB-4D36-A720-4ACC06741D38}" type="datetimeFigureOut">
               <a:rPr lang="en-US" smtClean="0"/>
-              <a:t>2/1/2015</a:t>
+              <a:t>2/3/2015</a:t>
             </a:fld>
             <a:endParaRPr lang="en-US"/>
           </a:p>
@@ -642,7 +646,7 @@
           <a:p>
             <a:fld id="{9B727278-6BFB-4D36-A720-4ACC06741D38}" type="datetimeFigureOut">
               <a:rPr lang="en-US" smtClean="0"/>
-              <a:t>2/1/2015</a:t>
+              <a:t>2/3/2015</a:t>
             </a:fld>
             <a:endParaRPr lang="en-US"/>
           </a:p>
@@ -812,7 +816,7 @@
           <a:p>
             <a:fld id="{9B727278-6BFB-4D36-A720-4ACC06741D38}" type="datetimeFigureOut">
               <a:rPr lang="en-US" smtClean="0"/>
-              <a:t>2/1/2015</a:t>
+              <a:t>2/3/2015</a:t>
             </a:fld>
             <a:endParaRPr lang="en-US"/>
           </a:p>
@@ -1058,7 +1062,7 @@
           <a:p>
             <a:fld id="{9B727278-6BFB-4D36-A720-4ACC06741D38}" type="datetimeFigureOut">
               <a:rPr lang="en-US" smtClean="0"/>
-              <a:t>2/1/2015</a:t>
+              <a:t>2/3/2015</a:t>
             </a:fld>
             <a:endParaRPr lang="en-US"/>
           </a:p>
@@ -1346,7 +1350,7 @@
           <a:p>
             <a:fld id="{9B727278-6BFB-4D36-A720-4ACC06741D38}" type="datetimeFigureOut">
               <a:rPr lang="en-US" smtClean="0"/>
-              <a:t>2/1/2015</a:t>
+              <a:t>2/3/2015</a:t>
             </a:fld>
             <a:endParaRPr lang="en-US"/>
           </a:p>
@@ -1768,7 +1772,7 @@
           <a:p>
             <a:fld id="{9B727278-6BFB-4D36-A720-4ACC06741D38}" type="datetimeFigureOut">
               <a:rPr lang="en-US" smtClean="0"/>
-              <a:t>2/1/2015</a:t>
+              <a:t>2/3/2015</a:t>
             </a:fld>
             <a:endParaRPr lang="en-US"/>
           </a:p>
@@ -1886,7 +1890,7 @@
           <a:p>
             <a:fld id="{9B727278-6BFB-4D36-A720-4ACC06741D38}" type="datetimeFigureOut">
               <a:rPr lang="en-US" smtClean="0"/>
-              <a:t>2/1/2015</a:t>
+              <a:t>2/3/2015</a:t>
             </a:fld>
             <a:endParaRPr lang="en-US"/>
           </a:p>
@@ -1981,7 +1985,7 @@
           <a:p>
             <a:fld id="{9B727278-6BFB-4D36-A720-4ACC06741D38}" type="datetimeFigureOut">
               <a:rPr lang="en-US" smtClean="0"/>
-              <a:t>2/1/2015</a:t>
+              <a:t>2/3/2015</a:t>
             </a:fld>
             <a:endParaRPr lang="en-US"/>
           </a:p>
@@ -2258,7 +2262,7 @@
           <a:p>
             <a:fld id="{9B727278-6BFB-4D36-A720-4ACC06741D38}" type="datetimeFigureOut">
               <a:rPr lang="en-US" smtClean="0"/>
-              <a:t>2/1/2015</a:t>
+              <a:t>2/3/2015</a:t>
             </a:fld>
             <a:endParaRPr lang="en-US"/>
           </a:p>
@@ -2511,7 +2515,7 @@
           <a:p>
             <a:fld id="{9B727278-6BFB-4D36-A720-4ACC06741D38}" type="datetimeFigureOut">
               <a:rPr lang="en-US" smtClean="0"/>
-              <a:t>2/1/2015</a:t>
+              <a:t>2/3/2015</a:t>
             </a:fld>
             <a:endParaRPr lang="en-US"/>
           </a:p>
@@ -2724,7 +2728,7 @@
           <a:p>
             <a:fld id="{9B727278-6BFB-4D36-A720-4ACC06741D38}" type="datetimeFigureOut">
               <a:rPr lang="en-US" smtClean="0"/>
-              <a:t>2/1/2015</a:t>
+              <a:t>2/3/2015</a:t>
             </a:fld>
             <a:endParaRPr lang="en-US"/>
           </a:p>
@@ -3225,13 +3229,53 @@
             <a:pPr lvl="1"/>
             <a:r>
               <a:rPr lang="en-US" dirty="0" smtClean="0"/>
-              <a:t>This should not be surprising: samples with high concentration of an element may have different matrix effects than samples with low concentration</a:t>
-            </a:r>
-          </a:p>
-          <a:p>
-            <a:r>
-              <a:rPr lang="en-US" dirty="0" smtClean="0"/>
-              <a:t>Expanding the database helped with this somewhat, but a single model still wasn’t enough</a:t>
+              <a:t>This should not be surprising: samples with </a:t>
+            </a:r>
+            <a:r>
+              <a:rPr lang="en-US" dirty="0" smtClean="0"/>
+              <a:t>high/low </a:t>
+            </a:r>
+            <a:r>
+              <a:rPr lang="en-US" dirty="0" smtClean="0"/>
+              <a:t>concentration of an element may have different </a:t>
+            </a:r>
+            <a:r>
+              <a:rPr lang="en-US" dirty="0" smtClean="0"/>
+              <a:t>spectral behavior (matrix effects) </a:t>
+            </a:r>
+            <a:r>
+              <a:rPr lang="en-US" dirty="0" smtClean="0"/>
+              <a:t>than samples with </a:t>
+            </a:r>
+            <a:r>
+              <a:rPr lang="en-US" dirty="0" smtClean="0"/>
+              <a:t>low/high </a:t>
+            </a:r>
+            <a:r>
+              <a:rPr lang="en-US" dirty="0" smtClean="0"/>
+              <a:t>concentration</a:t>
+            </a:r>
+          </a:p>
+          <a:p>
+            <a:r>
+              <a:rPr lang="en-US" dirty="0" smtClean="0"/>
+              <a:t>Expanding the database </a:t>
+            </a:r>
+            <a:r>
+              <a:rPr lang="en-US" dirty="0" smtClean="0"/>
+              <a:t>helps </a:t>
+            </a:r>
+            <a:r>
+              <a:rPr lang="en-US" dirty="0" smtClean="0"/>
+              <a:t>with this somewhat, but a single model still </a:t>
+            </a:r>
+            <a:r>
+              <a:rPr lang="en-US" dirty="0" smtClean="0"/>
+              <a:t>isn’t </a:t>
+            </a:r>
+            <a:r>
+              <a:rPr lang="en-US" dirty="0" smtClean="0"/>
+              <a:t>enough</a:t>
             </a:r>
           </a:p>
           <a:p>
@@ -3315,7 +3359,7 @@
         <p:spPr/>
         <p:txBody>
           <a:bodyPr>
-            <a:normAutofit lnSpcReduction="10000"/>
+            <a:normAutofit fontScale="85000" lnSpcReduction="10000"/>
           </a:bodyPr>
           <a:lstStyle/>
           <a:p>
@@ -3328,7 +3372,18 @@
             <a:pPr lvl="1"/>
             <a:r>
               <a:rPr lang="en-US" dirty="0" smtClean="0"/>
-              <a:t>Can restrict database by composition on the fly</a:t>
+              <a:t>Working with CCS files</a:t>
+            </a:r>
+          </a:p>
+          <a:p>
+            <a:pPr lvl="1"/>
+            <a:r>
+              <a:rPr lang="en-US" dirty="0" smtClean="0"/>
+              <a:t>Can </a:t>
+            </a:r>
+            <a:r>
+              <a:rPr lang="en-US" dirty="0" smtClean="0"/>
+              <a:t>restrict database by composition on the fly</a:t>
             </a:r>
           </a:p>
           <a:p>
@@ -3357,14 +3412,27 @@
             </a:r>
             <a:r>
               <a:rPr lang="en-US" dirty="0" smtClean="0"/>
-              <a:t> PLS algorithm, which gives identical results to our previous IDL PLS algorithm</a:t>
-            </a:r>
-          </a:p>
-          <a:p>
-            <a:r>
-              <a:rPr lang="en-US" dirty="0" smtClean="0"/>
-              <a:t>Use database with Sam’s ratio-based calibration transfer</a:t>
-            </a:r>
+              <a:t> PLS algorithm, which gives identical results to our previous IDL PLS </a:t>
+            </a:r>
+            <a:r>
+              <a:rPr lang="en-US" dirty="0" smtClean="0"/>
+              <a:t>algorithm</a:t>
+            </a:r>
+          </a:p>
+          <a:p>
+            <a:pPr lvl="1"/>
+            <a:endParaRPr lang="en-US" dirty="0" smtClean="0"/>
+          </a:p>
+          <a:p>
+            <a:r>
+              <a:rPr lang="en-US" dirty="0" smtClean="0"/>
+              <a:t>Use database with Sam’s ratio-based calibration </a:t>
+            </a:r>
+            <a:r>
+              <a:rPr lang="en-US" dirty="0" smtClean="0"/>
+              <a:t>transfer to partially correct Earth-Mars differences</a:t>
+            </a:r>
+            <a:endParaRPr lang="en-US" dirty="0" smtClean="0"/>
           </a:p>
           <a:p>
             <a:endParaRPr lang="en-US" dirty="0"/>
@@ -3442,7 +3510,7 @@
         </p:spPr>
         <p:txBody>
           <a:bodyPr>
-            <a:normAutofit fontScale="92500" lnSpcReduction="10000"/>
+            <a:normAutofit fontScale="92500" lnSpcReduction="20000"/>
           </a:bodyPr>
           <a:lstStyle/>
           <a:p>
@@ -3475,12 +3543,8 @@
           <a:p>
             <a:pPr lvl="1"/>
             <a:r>
-              <a:rPr lang="en-US" dirty="0" err="1" smtClean="0"/>
-              <a:t>RMSEP_cal</a:t>
-            </a:r>
-            <a:r>
-              <a:rPr lang="en-US" dirty="0" smtClean="0"/>
-              <a:t> (RMSE of full model predicting the 95A Mars </a:t>
+              <a:rPr lang="en-US" dirty="0" smtClean="0"/>
+              <a:t>RMSEP for </a:t>
             </a:r>
             <a:r>
               <a:rPr lang="en-US" dirty="0" err="1" smtClean="0"/>
@@ -3488,26 +3552,11 @@
             </a:r>
             <a:r>
               <a:rPr lang="en-US" dirty="0" smtClean="0"/>
-              <a:t> targets)</a:t>
-            </a:r>
-          </a:p>
-          <a:p>
-            <a:r>
-              <a:rPr lang="en-US" dirty="0" smtClean="0"/>
-              <a:t>Compare norm1 and norm3</a:t>
-            </a:r>
-          </a:p>
-          <a:p>
-            <a:r>
-              <a:rPr lang="en-US" dirty="0" smtClean="0"/>
-              <a:t>Try to choose # of components corresponding to “elbow” in curves where possible</a:t>
-            </a:r>
-          </a:p>
-          <a:p>
-            <a:pPr lvl="1"/>
-            <a:r>
-              <a:rPr lang="en-US" dirty="0" smtClean="0"/>
-              <a:t>Adjust for minima in </a:t>
+              <a:t> targets </a:t>
+            </a:r>
+            <a:r>
+              <a:rPr lang="en-US" dirty="0" smtClean="0"/>
+              <a:t>(RMSE of full model predicting the 95A Mars </a:t>
             </a:r>
             <a:r>
               <a:rPr lang="en-US" dirty="0" err="1" smtClean="0"/>
@@ -3515,7 +3564,38 @@
             </a:r>
             <a:r>
               <a:rPr lang="en-US" dirty="0" smtClean="0"/>
-              <a:t> target RMSEP, where relevant</a:t>
+              <a:t> targets)</a:t>
+            </a:r>
+          </a:p>
+          <a:p>
+            <a:r>
+              <a:rPr lang="en-US" dirty="0" smtClean="0"/>
+              <a:t>Compare norm1 and norm3</a:t>
+            </a:r>
+          </a:p>
+          <a:p>
+            <a:r>
+              <a:rPr lang="en-US" dirty="0" smtClean="0"/>
+              <a:t>Try to choose # of components corresponding to “elbow” in curves where possible</a:t>
+            </a:r>
+          </a:p>
+          <a:p>
+            <a:pPr lvl="1"/>
+            <a:r>
+              <a:rPr lang="en-US" dirty="0" smtClean="0"/>
+              <a:t>Adjust for minima in </a:t>
+            </a:r>
+            <a:r>
+              <a:rPr lang="en-US" dirty="0" err="1" smtClean="0"/>
+              <a:t>cal</a:t>
+            </a:r>
+            <a:r>
+              <a:rPr lang="en-US" dirty="0" smtClean="0"/>
+              <a:t> target RMSEP, where </a:t>
+            </a:r>
+            <a:r>
+              <a:rPr lang="en-US" dirty="0" smtClean="0"/>
+              <a:t>relevant/possible</a:t>
             </a:r>
             <a:endParaRPr lang="en-US" dirty="0"/>
           </a:p>
@@ -3586,7 +3666,9 @@
         </p:nvSpPr>
         <p:spPr/>
         <p:txBody>
-          <a:bodyPr/>
+          <a:bodyPr>
+            <a:normAutofit fontScale="85000" lnSpcReduction="20000"/>
+          </a:bodyPr>
           <a:lstStyle/>
           <a:p>
             <a:r>
@@ -3626,8 +3708,44 @@
             </a:r>
             <a:r>
               <a:rPr lang="en-US" dirty="0" smtClean="0"/>
-              <a:t>. Else use “mid” sub-model.</a:t>
-            </a:r>
+              <a:t>. Else use “mid” sub-model</a:t>
+            </a:r>
+            <a:r>
+              <a:rPr lang="en-US" dirty="0" smtClean="0"/>
+              <a:t>.</a:t>
+            </a:r>
+          </a:p>
+          <a:p>
+            <a:r>
+              <a:rPr lang="en-US" dirty="0" smtClean="0"/>
+              <a:t>Lots of “knobs” we can adjust to tune the results:</a:t>
+            </a:r>
+          </a:p>
+          <a:p>
+            <a:pPr lvl="1"/>
+            <a:r>
+              <a:rPr lang="en-US" dirty="0" smtClean="0"/>
+              <a:t>Change logic used</a:t>
+            </a:r>
+          </a:p>
+          <a:p>
+            <a:pPr lvl="1"/>
+            <a:r>
+              <a:rPr lang="en-US" dirty="0" smtClean="0"/>
+              <a:t>Change norm, NC</a:t>
+            </a:r>
+          </a:p>
+          <a:p>
+            <a:pPr lvl="1"/>
+            <a:r>
+              <a:rPr lang="en-US" dirty="0" smtClean="0"/>
+              <a:t>Change </a:t>
+            </a:r>
+            <a:r>
+              <a:rPr lang="en-US" dirty="0" err="1" smtClean="0"/>
+              <a:t>submodels</a:t>
+            </a:r>
+            <a:endParaRPr lang="en-US" dirty="0" smtClean="0"/>
           </a:p>
           <a:p>
             <a:pPr lvl="1"/>
@@ -3639,6 +3757,354 @@
     <p:extLst>
       <p:ext uri="{BB962C8B-B14F-4D97-AF65-F5344CB8AC3E}">
         <p14:creationId xmlns:p14="http://schemas.microsoft.com/office/powerpoint/2010/main" val="189831458"/>
+      </p:ext>
+    </p:extLst>
+  </p:cSld>
+  <p:clrMapOvr>
+    <a:masterClrMapping/>
+  </p:clrMapOvr>
+</p:sld>
+</file>
+
+<file path=ppt/slides/slide6.xml><?xml version="1.0" encoding="utf-8"?>
+<p:sld xmlns:a="http://schemas.openxmlformats.org/drawingml/2006/main" xmlns:r="http://schemas.openxmlformats.org/officeDocument/2006/relationships" xmlns:p="http://schemas.openxmlformats.org/presentationml/2006/main">
+  <p:cSld>
+    <p:spTree>
+      <p:nvGrpSpPr>
+        <p:cNvPr id="1" name=""/>
+        <p:cNvGrpSpPr/>
+        <p:nvPr/>
+      </p:nvGrpSpPr>
+      <p:grpSpPr>
+        <a:xfrm>
+          <a:off x="0" y="0"/>
+          <a:ext cx="0" cy="0"/>
+          <a:chOff x="0" y="0"/>
+          <a:chExt cx="0" cy="0"/>
+        </a:xfrm>
+      </p:grpSpPr>
+      <p:pic>
+        <p:nvPicPr>
+          <p:cNvPr id="4" name="Picture 3"/>
+          <p:cNvPicPr>
+            <a:picLocks noChangeAspect="1"/>
+          </p:cNvPicPr>
+          <p:nvPr/>
+        </p:nvPicPr>
+        <p:blipFill>
+          <a:blip r:embed="rId2">
+            <a:extLst>
+              <a:ext uri="{28A0092B-C50C-407E-A947-70E740481C1C}">
+                <a14:useLocalDpi xmlns:a14="http://schemas.microsoft.com/office/drawing/2010/main" val="0"/>
+              </a:ext>
+            </a:extLst>
+          </a:blip>
+          <a:stretch>
+            <a:fillRect/>
+          </a:stretch>
+        </p:blipFill>
+        <p:spPr>
+          <a:xfrm>
+            <a:off x="134470" y="0"/>
+            <a:ext cx="8875059" cy="6858000"/>
+          </a:xfrm>
+          <a:prstGeom prst="rect">
+            <a:avLst/>
+          </a:prstGeom>
+        </p:spPr>
+      </p:pic>
+    </p:spTree>
+    <p:extLst>
+      <p:ext uri="{BB962C8B-B14F-4D97-AF65-F5344CB8AC3E}">
+        <p14:creationId xmlns:p14="http://schemas.microsoft.com/office/powerpoint/2010/main" val="4100649659"/>
+      </p:ext>
+    </p:extLst>
+  </p:cSld>
+  <p:clrMapOvr>
+    <a:masterClrMapping/>
+  </p:clrMapOvr>
+</p:sld>
+</file>
+
+<file path=ppt/slides/slide7.xml><?xml version="1.0" encoding="utf-8"?>
+<p:sld xmlns:a="http://schemas.openxmlformats.org/drawingml/2006/main" xmlns:r="http://schemas.openxmlformats.org/officeDocument/2006/relationships" xmlns:p="http://schemas.openxmlformats.org/presentationml/2006/main">
+  <p:cSld>
+    <p:spTree>
+      <p:nvGrpSpPr>
+        <p:cNvPr id="1" name=""/>
+        <p:cNvGrpSpPr/>
+        <p:nvPr/>
+      </p:nvGrpSpPr>
+      <p:grpSpPr>
+        <a:xfrm>
+          <a:off x="0" y="0"/>
+          <a:ext cx="0" cy="0"/>
+          <a:chOff x="0" y="0"/>
+          <a:chExt cx="0" cy="0"/>
+        </a:xfrm>
+      </p:grpSpPr>
+      <p:pic>
+        <p:nvPicPr>
+          <p:cNvPr id="2" name="Picture 1"/>
+          <p:cNvPicPr>
+            <a:picLocks noChangeAspect="1"/>
+          </p:cNvPicPr>
+          <p:nvPr/>
+        </p:nvPicPr>
+        <p:blipFill>
+          <a:blip r:embed="rId2">
+            <a:extLst>
+              <a:ext uri="{28A0092B-C50C-407E-A947-70E740481C1C}">
+                <a14:useLocalDpi xmlns:a14="http://schemas.microsoft.com/office/drawing/2010/main" val="0"/>
+              </a:ext>
+            </a:extLst>
+          </a:blip>
+          <a:stretch>
+            <a:fillRect/>
+          </a:stretch>
+        </p:blipFill>
+        <p:spPr>
+          <a:xfrm>
+            <a:off x="134470" y="0"/>
+            <a:ext cx="8875059" cy="6858000"/>
+          </a:xfrm>
+          <a:prstGeom prst="rect">
+            <a:avLst/>
+          </a:prstGeom>
+        </p:spPr>
+      </p:pic>
+      <p:sp>
+        <p:nvSpPr>
+          <p:cNvPr id="3" name="TextBox 2"/>
+          <p:cNvSpPr txBox="1"/>
+          <p:nvPr/>
+        </p:nvSpPr>
+        <p:spPr>
+          <a:xfrm>
+            <a:off x="0" y="4750475"/>
+            <a:ext cx="1447800" cy="2031325"/>
+          </a:xfrm>
+          <a:prstGeom prst="rect">
+            <a:avLst/>
+          </a:prstGeom>
+          <a:noFill/>
+        </p:spPr>
+        <p:txBody>
+          <a:bodyPr wrap="square" rtlCol="0">
+            <a:spAutoFit/>
+          </a:bodyPr>
+          <a:lstStyle/>
+          <a:p>
+            <a:r>
+              <a:rPr lang="en-US" dirty="0" smtClean="0"/>
+              <a:t>Note: Low model </a:t>
+            </a:r>
+          </a:p>
+          <a:p>
+            <a:r>
+              <a:rPr lang="en-US" dirty="0" smtClean="0"/>
+              <a:t>much better than full model for low compositions</a:t>
+            </a:r>
+            <a:endParaRPr lang="en-US" dirty="0"/>
+          </a:p>
+        </p:txBody>
+      </p:sp>
+      <p:cxnSp>
+        <p:nvCxnSpPr>
+          <p:cNvPr id="5" name="Straight Arrow Connector 4"/>
+          <p:cNvCxnSpPr/>
+          <p:nvPr/>
+        </p:nvCxnSpPr>
+        <p:spPr>
+          <a:xfrm flipV="1">
+            <a:off x="1371600" y="6019800"/>
+            <a:ext cx="533400" cy="381000"/>
+          </a:xfrm>
+          <a:prstGeom prst="straightConnector1">
+            <a:avLst/>
+          </a:prstGeom>
+          <a:ln w="28575">
+            <a:solidFill>
+              <a:schemeClr val="tx1"/>
+            </a:solidFill>
+            <a:tailEnd type="arrow"/>
+          </a:ln>
+        </p:spPr>
+        <p:style>
+          <a:lnRef idx="1">
+            <a:schemeClr val="accent1"/>
+          </a:lnRef>
+          <a:fillRef idx="0">
+            <a:schemeClr val="accent1"/>
+          </a:fillRef>
+          <a:effectRef idx="0">
+            <a:schemeClr val="accent1"/>
+          </a:effectRef>
+          <a:fontRef idx="minor">
+            <a:schemeClr val="tx1"/>
+          </a:fontRef>
+        </p:style>
+      </p:cxnSp>
+      <p:cxnSp>
+        <p:nvCxnSpPr>
+          <p:cNvPr id="6" name="Straight Arrow Connector 5"/>
+          <p:cNvCxnSpPr/>
+          <p:nvPr/>
+        </p:nvCxnSpPr>
+        <p:spPr>
+          <a:xfrm flipV="1">
+            <a:off x="914400" y="4191000"/>
+            <a:ext cx="381000" cy="609600"/>
+          </a:xfrm>
+          <a:prstGeom prst="straightConnector1">
+            <a:avLst/>
+          </a:prstGeom>
+          <a:ln w="28575">
+            <a:solidFill>
+              <a:schemeClr val="tx1"/>
+            </a:solidFill>
+            <a:tailEnd type="arrow"/>
+          </a:ln>
+        </p:spPr>
+        <p:style>
+          <a:lnRef idx="1">
+            <a:schemeClr val="accent1"/>
+          </a:lnRef>
+          <a:fillRef idx="0">
+            <a:schemeClr val="accent1"/>
+          </a:fillRef>
+          <a:effectRef idx="0">
+            <a:schemeClr val="accent1"/>
+          </a:effectRef>
+          <a:fontRef idx="minor">
+            <a:schemeClr val="tx1"/>
+          </a:fontRef>
+        </p:style>
+      </p:cxnSp>
+    </p:spTree>
+    <p:extLst>
+      <p:ext uri="{BB962C8B-B14F-4D97-AF65-F5344CB8AC3E}">
+        <p14:creationId xmlns:p14="http://schemas.microsoft.com/office/powerpoint/2010/main" val="305273461"/>
+      </p:ext>
+    </p:extLst>
+  </p:cSld>
+  <p:clrMapOvr>
+    <a:masterClrMapping/>
+  </p:clrMapOvr>
+</p:sld>
+</file>
+
+<file path=ppt/slides/slide8.xml><?xml version="1.0" encoding="utf-8"?>
+<p:sld xmlns:a="http://schemas.openxmlformats.org/drawingml/2006/main" xmlns:r="http://schemas.openxmlformats.org/officeDocument/2006/relationships" xmlns:p="http://schemas.openxmlformats.org/presentationml/2006/main">
+  <p:cSld>
+    <p:spTree>
+      <p:nvGrpSpPr>
+        <p:cNvPr id="1" name=""/>
+        <p:cNvGrpSpPr/>
+        <p:nvPr/>
+      </p:nvGrpSpPr>
+      <p:grpSpPr>
+        <a:xfrm>
+          <a:off x="0" y="0"/>
+          <a:ext cx="0" cy="0"/>
+          <a:chOff x="0" y="0"/>
+          <a:chExt cx="0" cy="0"/>
+        </a:xfrm>
+      </p:grpSpPr>
+      <p:pic>
+        <p:nvPicPr>
+          <p:cNvPr id="2" name="Picture 1"/>
+          <p:cNvPicPr>
+            <a:picLocks noChangeAspect="1"/>
+          </p:cNvPicPr>
+          <p:nvPr/>
+        </p:nvPicPr>
+        <p:blipFill>
+          <a:blip r:embed="rId2">
+            <a:extLst>
+              <a:ext uri="{28A0092B-C50C-407E-A947-70E740481C1C}">
+                <a14:useLocalDpi xmlns:a14="http://schemas.microsoft.com/office/drawing/2010/main" val="0"/>
+              </a:ext>
+            </a:extLst>
+          </a:blip>
+          <a:stretch>
+            <a:fillRect/>
+          </a:stretch>
+        </p:blipFill>
+        <p:spPr>
+          <a:xfrm>
+            <a:off x="134470" y="0"/>
+            <a:ext cx="8875059" cy="6858000"/>
+          </a:xfrm>
+          <a:prstGeom prst="rect">
+            <a:avLst/>
+          </a:prstGeom>
+        </p:spPr>
+      </p:pic>
+    </p:spTree>
+    <p:extLst>
+      <p:ext uri="{BB962C8B-B14F-4D97-AF65-F5344CB8AC3E}">
+        <p14:creationId xmlns:p14="http://schemas.microsoft.com/office/powerpoint/2010/main" val="1589625936"/>
+      </p:ext>
+    </p:extLst>
+  </p:cSld>
+  <p:clrMapOvr>
+    <a:masterClrMapping/>
+  </p:clrMapOvr>
+</p:sld>
+</file>
+
+<file path=ppt/slides/slide9.xml><?xml version="1.0" encoding="utf-8"?>
+<p:sld xmlns:a="http://schemas.openxmlformats.org/drawingml/2006/main" xmlns:r="http://schemas.openxmlformats.org/officeDocument/2006/relationships" xmlns:p="http://schemas.openxmlformats.org/presentationml/2006/main">
+  <p:cSld>
+    <p:spTree>
+      <p:nvGrpSpPr>
+        <p:cNvPr id="1" name=""/>
+        <p:cNvGrpSpPr/>
+        <p:nvPr/>
+      </p:nvGrpSpPr>
+      <p:grpSpPr>
+        <a:xfrm>
+          <a:off x="0" y="0"/>
+          <a:ext cx="0" cy="0"/>
+          <a:chOff x="0" y="0"/>
+          <a:chExt cx="0" cy="0"/>
+        </a:xfrm>
+      </p:grpSpPr>
+      <p:pic>
+        <p:nvPicPr>
+          <p:cNvPr id="2" name="Picture 1"/>
+          <p:cNvPicPr>
+            <a:picLocks noChangeAspect="1"/>
+          </p:cNvPicPr>
+          <p:nvPr/>
+        </p:nvPicPr>
+        <p:blipFill>
+          <a:blip r:embed="rId2">
+            <a:extLst>
+              <a:ext uri="{28A0092B-C50C-407E-A947-70E740481C1C}">
+                <a14:useLocalDpi xmlns:a14="http://schemas.microsoft.com/office/drawing/2010/main" val="0"/>
+              </a:ext>
+            </a:extLst>
+          </a:blip>
+          <a:stretch>
+            <a:fillRect/>
+          </a:stretch>
+        </p:blipFill>
+        <p:spPr>
+          <a:xfrm>
+            <a:off x="134471" y="0"/>
+            <a:ext cx="8875059" cy="6858000"/>
+          </a:xfrm>
+          <a:prstGeom prst="rect">
+            <a:avLst/>
+          </a:prstGeom>
+        </p:spPr>
+      </p:pic>
+    </p:spTree>
+    <p:extLst>
+      <p:ext uri="{BB962C8B-B14F-4D97-AF65-F5344CB8AC3E}">
+        <p14:creationId xmlns:p14="http://schemas.microsoft.com/office/powerpoint/2010/main" val="3130211604"/>
       </p:ext>
     </p:extLst>
   </p:cSld>

</xml_diff>

<commit_message>
re-do MgO calcs to get RMSE cal plots
</commit_message>
<xml_diff>
--- a/ChemCam PLS1 Sub-Model Calibration.pptx
+++ b/ChemCam PLS1 Sub-Model Calibration.pptx
@@ -9,11 +9,12 @@
     <p:sldId id="257" r:id="rId3"/>
     <p:sldId id="258" r:id="rId4"/>
     <p:sldId id="260" r:id="rId5"/>
-    <p:sldId id="259" r:id="rId6"/>
-    <p:sldId id="261" r:id="rId7"/>
-    <p:sldId id="262" r:id="rId8"/>
-    <p:sldId id="263" r:id="rId9"/>
-    <p:sldId id="264" r:id="rId10"/>
+    <p:sldId id="267" r:id="rId6"/>
+    <p:sldId id="259" r:id="rId7"/>
+    <p:sldId id="261" r:id="rId8"/>
+    <p:sldId id="262" r:id="rId9"/>
+    <p:sldId id="266" r:id="rId10"/>
+    <p:sldId id="265" r:id="rId11"/>
   </p:sldIdLst>
   <p:sldSz cx="9144000" cy="6858000" type="screen4x3"/>
   <p:notesSz cx="6858000" cy="9144000"/>
@@ -3158,6 +3159,96 @@
 </p:sld>
 </file>
 
+<file path=ppt/slides/slide10.xml><?xml version="1.0" encoding="utf-8"?>
+<p:sld xmlns:a="http://schemas.openxmlformats.org/drawingml/2006/main" xmlns:r="http://schemas.openxmlformats.org/officeDocument/2006/relationships" xmlns:p="http://schemas.openxmlformats.org/presentationml/2006/main">
+  <p:cSld>
+    <p:spTree>
+      <p:nvGrpSpPr>
+        <p:cNvPr id="1" name=""/>
+        <p:cNvGrpSpPr/>
+        <p:nvPr/>
+      </p:nvGrpSpPr>
+      <p:grpSpPr>
+        <a:xfrm>
+          <a:off x="0" y="0"/>
+          <a:ext cx="0" cy="0"/>
+          <a:chOff x="0" y="0"/>
+          <a:chExt cx="0" cy="0"/>
+        </a:xfrm>
+      </p:grpSpPr>
+      <p:pic>
+        <p:nvPicPr>
+          <p:cNvPr id="2" name="Picture 1"/>
+          <p:cNvPicPr>
+            <a:picLocks noChangeAspect="1"/>
+          </p:cNvPicPr>
+          <p:nvPr/>
+        </p:nvPicPr>
+        <p:blipFill>
+          <a:blip r:embed="rId2">
+            <a:extLst>
+              <a:ext uri="{28A0092B-C50C-407E-A947-70E740481C1C}">
+                <a14:useLocalDpi xmlns:a14="http://schemas.microsoft.com/office/drawing/2010/main" val="0"/>
+              </a:ext>
+            </a:extLst>
+          </a:blip>
+          <a:stretch>
+            <a:fillRect/>
+          </a:stretch>
+        </p:blipFill>
+        <p:spPr>
+          <a:xfrm>
+            <a:off x="134471" y="0"/>
+            <a:ext cx="8875059" cy="6858000"/>
+          </a:xfrm>
+          <a:prstGeom prst="rect">
+            <a:avLst/>
+          </a:prstGeom>
+        </p:spPr>
+      </p:pic>
+      <p:sp>
+        <p:nvSpPr>
+          <p:cNvPr id="4" name="TextBox 3"/>
+          <p:cNvSpPr txBox="1"/>
+          <p:nvPr/>
+        </p:nvSpPr>
+        <p:spPr>
+          <a:xfrm>
+            <a:off x="0" y="0"/>
+            <a:ext cx="3886200" cy="646331"/>
+          </a:xfrm>
+          <a:prstGeom prst="rect">
+            <a:avLst/>
+          </a:prstGeom>
+          <a:noFill/>
+        </p:spPr>
+        <p:txBody>
+          <a:bodyPr wrap="square" rtlCol="0">
+            <a:spAutoFit/>
+          </a:bodyPr>
+          <a:lstStyle/>
+          <a:p>
+            <a:r>
+              <a:rPr lang="en-US" dirty="0" smtClean="0"/>
+              <a:t>Note: These RMSE #s obviously need to be rounded…</a:t>
+            </a:r>
+            <a:endParaRPr lang="en-US" dirty="0"/>
+          </a:p>
+        </p:txBody>
+      </p:sp>
+    </p:spTree>
+    <p:extLst>
+      <p:ext uri="{BB962C8B-B14F-4D97-AF65-F5344CB8AC3E}">
+        <p14:creationId xmlns:p14="http://schemas.microsoft.com/office/powerpoint/2010/main" val="1303557470"/>
+      </p:ext>
+    </p:extLst>
+  </p:cSld>
+  <p:clrMapOvr>
+    <a:masterClrMapping/>
+  </p:clrMapOvr>
+</p:sld>
+</file>
+
 <file path=ppt/slides/slide2.xml><?xml version="1.0" encoding="utf-8"?>
 <p:sld xmlns:a="http://schemas.openxmlformats.org/drawingml/2006/main" xmlns:r="http://schemas.openxmlformats.org/officeDocument/2006/relationships" xmlns:p="http://schemas.openxmlformats.org/presentationml/2006/main">
   <p:cSld>
@@ -3229,53 +3320,13 @@
             <a:pPr lvl="1"/>
             <a:r>
               <a:rPr lang="en-US" dirty="0" smtClean="0"/>
-              <a:t>This should not be surprising: samples with </a:t>
-            </a:r>
-            <a:r>
-              <a:rPr lang="en-US" dirty="0" smtClean="0"/>
-              <a:t>high/low </a:t>
-            </a:r>
-            <a:r>
-              <a:rPr lang="en-US" dirty="0" smtClean="0"/>
-              <a:t>concentration of an element may have different </a:t>
-            </a:r>
-            <a:r>
-              <a:rPr lang="en-US" dirty="0" smtClean="0"/>
-              <a:t>spectral behavior (matrix effects) </a:t>
-            </a:r>
-            <a:r>
-              <a:rPr lang="en-US" dirty="0" smtClean="0"/>
-              <a:t>than samples with </a:t>
-            </a:r>
-            <a:r>
-              <a:rPr lang="en-US" dirty="0" smtClean="0"/>
-              <a:t>low/high </a:t>
-            </a:r>
-            <a:r>
-              <a:rPr lang="en-US" dirty="0" smtClean="0"/>
-              <a:t>concentration</a:t>
-            </a:r>
-          </a:p>
-          <a:p>
-            <a:r>
-              <a:rPr lang="en-US" dirty="0" smtClean="0"/>
-              <a:t>Expanding the database </a:t>
-            </a:r>
-            <a:r>
-              <a:rPr lang="en-US" dirty="0" smtClean="0"/>
-              <a:t>helps </a:t>
-            </a:r>
-            <a:r>
-              <a:rPr lang="en-US" dirty="0" smtClean="0"/>
-              <a:t>with this somewhat, but a single model still </a:t>
-            </a:r>
-            <a:r>
-              <a:rPr lang="en-US" dirty="0" smtClean="0"/>
-              <a:t>isn’t </a:t>
-            </a:r>
-            <a:r>
-              <a:rPr lang="en-US" dirty="0" smtClean="0"/>
-              <a:t>enough</a:t>
+              <a:t>This should not be surprising: samples with high/low concentration of an element may have different spectral behavior (matrix effects) than samples with low/high concentration</a:t>
+            </a:r>
+          </a:p>
+          <a:p>
+            <a:r>
+              <a:rPr lang="en-US" dirty="0" smtClean="0"/>
+              <a:t>Expanding the database helps with this somewhat, but a single model still isn’t enough</a:t>
             </a:r>
           </a:p>
           <a:p>
@@ -3359,7 +3410,7 @@
         <p:spPr/>
         <p:txBody>
           <a:bodyPr>
-            <a:normAutofit fontScale="85000" lnSpcReduction="10000"/>
+            <a:normAutofit fontScale="85000" lnSpcReduction="20000"/>
           </a:bodyPr>
           <a:lstStyle/>
           <a:p>
@@ -3379,26 +3430,32 @@
             <a:pPr lvl="1"/>
             <a:r>
               <a:rPr lang="en-US" dirty="0" smtClean="0"/>
-              <a:t>Can </a:t>
-            </a:r>
-            <a:r>
-              <a:rPr lang="en-US" dirty="0" smtClean="0"/>
-              <a:t>restrict database by composition on the fly</a:t>
+              <a:t>Can restrict database by composition on the fly</a:t>
             </a:r>
           </a:p>
           <a:p>
             <a:pPr lvl="1"/>
             <a:r>
               <a:rPr lang="en-US" dirty="0" smtClean="0"/>
-              <a:t>Accepts input files to specify spectra to remove or keep, allowing outlier removal</a:t>
-            </a:r>
+              <a:t>Accepts input files to specify spectra to remove or keep, allowing outlier </a:t>
+            </a:r>
+            <a:r>
+              <a:rPr lang="en-US" dirty="0" smtClean="0"/>
+              <a:t>removal (if desired)</a:t>
+            </a:r>
+            <a:endParaRPr lang="en-US" dirty="0" smtClean="0"/>
           </a:p>
           <a:p>
             <a:pPr lvl="1"/>
             <a:r>
               <a:rPr lang="en-US" dirty="0" smtClean="0"/>
-              <a:t>Automatically generates relevant plots</a:t>
-            </a:r>
+              <a:t>Automatically generates relevant </a:t>
+            </a:r>
+            <a:r>
+              <a:rPr lang="en-US" dirty="0" smtClean="0"/>
+              <a:t>plots, and lots of other useful output</a:t>
+            </a:r>
+            <a:endParaRPr lang="en-US" dirty="0" smtClean="0"/>
           </a:p>
           <a:p>
             <a:pPr lvl="1"/>
@@ -3416,8 +3473,9 @@
             </a:r>
             <a:r>
               <a:rPr lang="en-US" dirty="0" smtClean="0"/>
-              <a:t>algorithm</a:t>
-            </a:r>
+              <a:t>algorithm, given identical input</a:t>
+            </a:r>
+            <a:endParaRPr lang="en-US" dirty="0" smtClean="0"/>
           </a:p>
           <a:p>
             <a:pPr lvl="1"/>
@@ -3426,13 +3484,8 @@
           <a:p>
             <a:r>
               <a:rPr lang="en-US" dirty="0" smtClean="0"/>
-              <a:t>Use database with Sam’s ratio-based calibration </a:t>
-            </a:r>
-            <a:r>
-              <a:rPr lang="en-US" dirty="0" smtClean="0"/>
-              <a:t>transfer to partially correct Earth-Mars differences</a:t>
-            </a:r>
-            <a:endParaRPr lang="en-US" dirty="0" smtClean="0"/>
+              <a:t>Use database with Sam’s ratio-based calibration transfer to partially correct Earth-Mars differences</a:t>
+            </a:r>
           </a:p>
           <a:p>
             <a:endParaRPr lang="en-US" dirty="0"/>
@@ -3552,11 +3605,7 @@
             </a:r>
             <a:r>
               <a:rPr lang="en-US" dirty="0" smtClean="0"/>
-              <a:t> targets </a:t>
-            </a:r>
-            <a:r>
-              <a:rPr lang="en-US" dirty="0" smtClean="0"/>
-              <a:t>(RMSE of full model predicting the 95A Mars </a:t>
+              <a:t> targets (RMSE of full model predicting the 95A Mars </a:t>
             </a:r>
             <a:r>
               <a:rPr lang="en-US" dirty="0" err="1" smtClean="0"/>
@@ -3570,8 +3619,13 @@
           <a:p>
             <a:r>
               <a:rPr lang="en-US" dirty="0" smtClean="0"/>
-              <a:t>Compare norm1 and norm3</a:t>
-            </a:r>
+              <a:t>Compare norm1 and </a:t>
+            </a:r>
+            <a:r>
+              <a:rPr lang="en-US" dirty="0" smtClean="0"/>
+              <a:t>norm3, up to 20 components</a:t>
+            </a:r>
+            <a:endParaRPr lang="en-US" dirty="0" smtClean="0"/>
           </a:p>
           <a:p>
             <a:r>
@@ -3591,11 +3645,7 @@
             </a:r>
             <a:r>
               <a:rPr lang="en-US" dirty="0" smtClean="0"/>
-              <a:t> target RMSEP, where </a:t>
-            </a:r>
-            <a:r>
-              <a:rPr lang="en-US" dirty="0" smtClean="0"/>
-              <a:t>relevant/possible</a:t>
+              <a:t> target RMSEP, where relevant/possible</a:t>
             </a:r>
             <a:endParaRPr lang="en-US" dirty="0"/>
           </a:p>
@@ -3646,6 +3696,74 @@
           <a:bodyPr/>
           <a:lstStyle/>
           <a:p>
+            <a:endParaRPr lang="en-US"/>
+          </a:p>
+        </p:txBody>
+      </p:sp>
+      <p:sp>
+        <p:nvSpPr>
+          <p:cNvPr id="3" name="Content Placeholder 2"/>
+          <p:cNvSpPr>
+            <a:spLocks noGrp="1"/>
+          </p:cNvSpPr>
+          <p:nvPr>
+            <p:ph idx="1"/>
+          </p:nvPr>
+        </p:nvSpPr>
+        <p:spPr/>
+        <p:txBody>
+          <a:bodyPr/>
+          <a:lstStyle/>
+          <a:p>
+            <a:endParaRPr lang="en-US"/>
+          </a:p>
+        </p:txBody>
+      </p:sp>
+    </p:spTree>
+    <p:extLst>
+      <p:ext uri="{BB962C8B-B14F-4D97-AF65-F5344CB8AC3E}">
+        <p14:creationId xmlns:p14="http://schemas.microsoft.com/office/powerpoint/2010/main" val="2205346021"/>
+      </p:ext>
+    </p:extLst>
+  </p:cSld>
+  <p:clrMapOvr>
+    <a:masterClrMapping/>
+  </p:clrMapOvr>
+</p:sld>
+</file>
+
+<file path=ppt/slides/slide6.xml><?xml version="1.0" encoding="utf-8"?>
+<p:sld xmlns:a="http://schemas.openxmlformats.org/drawingml/2006/main" xmlns:r="http://schemas.openxmlformats.org/officeDocument/2006/relationships" xmlns:p="http://schemas.openxmlformats.org/presentationml/2006/main">
+  <p:cSld>
+    <p:spTree>
+      <p:nvGrpSpPr>
+        <p:cNvPr id="1" name=""/>
+        <p:cNvGrpSpPr/>
+        <p:nvPr/>
+      </p:nvGrpSpPr>
+      <p:grpSpPr>
+        <a:xfrm>
+          <a:off x="0" y="0"/>
+          <a:ext cx="0" cy="0"/>
+          <a:chOff x="0" y="0"/>
+          <a:chExt cx="0" cy="0"/>
+        </a:xfrm>
+      </p:grpSpPr>
+      <p:sp>
+        <p:nvSpPr>
+          <p:cNvPr id="2" name="Title 1"/>
+          <p:cNvSpPr>
+            <a:spLocks noGrp="1"/>
+          </p:cNvSpPr>
+          <p:nvPr>
+            <p:ph type="title"/>
+          </p:nvPr>
+        </p:nvSpPr>
+        <p:spPr/>
+        <p:txBody>
+          <a:bodyPr/>
+          <a:lstStyle/>
+          <a:p>
             <a:r>
               <a:rPr lang="en-US" dirty="0" smtClean="0"/>
               <a:t>Predictions</a:t>
@@ -3667,7 +3785,7 @@
         <p:spPr/>
         <p:txBody>
           <a:bodyPr>
-            <a:normAutofit fontScale="85000" lnSpcReduction="20000"/>
+            <a:normAutofit fontScale="70000" lnSpcReduction="20000"/>
           </a:bodyPr>
           <a:lstStyle/>
           <a:p>
@@ -3714,6 +3832,14 @@
               <a:rPr lang="en-US" dirty="0" smtClean="0"/>
               <a:t>.</a:t>
             </a:r>
+          </a:p>
+          <a:p>
+            <a:pPr lvl="1"/>
+            <a:r>
+              <a:rPr lang="en-US" dirty="0" smtClean="0"/>
+              <a:t>We will probably want to do something to smoothly transition between sub-models</a:t>
+            </a:r>
+            <a:endParaRPr lang="en-US" dirty="0" smtClean="0"/>
           </a:p>
           <a:p>
             <a:r>
@@ -3766,7 +3892,7 @@
 </p:sld>
 </file>
 
-<file path=ppt/slides/slide6.xml><?xml version="1.0" encoding="utf-8"?>
+<file path=ppt/slides/slide7.xml><?xml version="1.0" encoding="utf-8"?>
 <p:sld xmlns:a="http://schemas.openxmlformats.org/drawingml/2006/main" xmlns:r="http://schemas.openxmlformats.org/officeDocument/2006/relationships" xmlns:p="http://schemas.openxmlformats.org/presentationml/2006/main">
   <p:cSld>
     <p:spTree>
@@ -3813,6 +3939,36 @@
           </a:prstGeom>
         </p:spPr>
       </p:pic>
+      <p:sp>
+        <p:nvSpPr>
+          <p:cNvPr id="2" name="TextBox 1"/>
+          <p:cNvSpPr txBox="1"/>
+          <p:nvPr/>
+        </p:nvSpPr>
+        <p:spPr>
+          <a:xfrm>
+            <a:off x="0" y="0"/>
+            <a:ext cx="3886200" cy="646331"/>
+          </a:xfrm>
+          <a:prstGeom prst="rect">
+            <a:avLst/>
+          </a:prstGeom>
+          <a:noFill/>
+        </p:spPr>
+        <p:txBody>
+          <a:bodyPr wrap="square" rtlCol="0">
+            <a:spAutoFit/>
+          </a:bodyPr>
+          <a:lstStyle/>
+          <a:p>
+            <a:r>
+              <a:rPr lang="en-US" dirty="0" smtClean="0"/>
+              <a:t>Note: These RMSE #s obviously need to be rounded…</a:t>
+            </a:r>
+            <a:endParaRPr lang="en-US" dirty="0"/>
+          </a:p>
+        </p:txBody>
+      </p:sp>
     </p:spTree>
     <p:extLst>
       <p:ext uri="{BB962C8B-B14F-4D97-AF65-F5344CB8AC3E}">
@@ -3826,7 +3982,7 @@
 </p:sld>
 </file>
 
-<file path=ppt/slides/slide7.xml><?xml version="1.0" encoding="utf-8"?>
+<file path=ppt/slides/slide8.xml><?xml version="1.0" encoding="utf-8"?>
 <p:sld xmlns:a="http://schemas.openxmlformats.org/drawingml/2006/main" xmlns:r="http://schemas.openxmlformats.org/officeDocument/2006/relationships" xmlns:p="http://schemas.openxmlformats.org/presentationml/2006/main">
   <p:cSld>
     <p:spTree>
@@ -3897,7 +4053,15 @@
           <a:p>
             <a:r>
               <a:rPr lang="en-US" dirty="0" smtClean="0"/>
-              <a:t>Note: Low model </a:t>
+              <a:t>Note: </a:t>
+            </a:r>
+            <a:r>
+              <a:rPr lang="en-US" dirty="0" smtClean="0"/>
+              <a:t>MgO low </a:t>
+            </a:r>
+            <a:r>
+              <a:rPr lang="en-US" dirty="0" smtClean="0"/>
+              <a:t>model </a:t>
             </a:r>
           </a:p>
           <a:p>
@@ -3981,70 +4145,40 @@
           </a:fontRef>
         </p:style>
       </p:cxnSp>
+      <p:sp>
+        <p:nvSpPr>
+          <p:cNvPr id="7" name="TextBox 6"/>
+          <p:cNvSpPr txBox="1"/>
+          <p:nvPr/>
+        </p:nvSpPr>
+        <p:spPr>
+          <a:xfrm>
+            <a:off x="0" y="0"/>
+            <a:ext cx="3886200" cy="646331"/>
+          </a:xfrm>
+          <a:prstGeom prst="rect">
+            <a:avLst/>
+          </a:prstGeom>
+          <a:noFill/>
+        </p:spPr>
+        <p:txBody>
+          <a:bodyPr wrap="square" rtlCol="0">
+            <a:spAutoFit/>
+          </a:bodyPr>
+          <a:lstStyle/>
+          <a:p>
+            <a:r>
+              <a:rPr lang="en-US" dirty="0" smtClean="0"/>
+              <a:t>Note: These RMSE #s obviously need to be rounded…</a:t>
+            </a:r>
+            <a:endParaRPr lang="en-US" dirty="0"/>
+          </a:p>
+        </p:txBody>
+      </p:sp>
     </p:spTree>
     <p:extLst>
       <p:ext uri="{BB962C8B-B14F-4D97-AF65-F5344CB8AC3E}">
         <p14:creationId xmlns:p14="http://schemas.microsoft.com/office/powerpoint/2010/main" val="305273461"/>
-      </p:ext>
-    </p:extLst>
-  </p:cSld>
-  <p:clrMapOvr>
-    <a:masterClrMapping/>
-  </p:clrMapOvr>
-</p:sld>
-</file>
-
-<file path=ppt/slides/slide8.xml><?xml version="1.0" encoding="utf-8"?>
-<p:sld xmlns:a="http://schemas.openxmlformats.org/drawingml/2006/main" xmlns:r="http://schemas.openxmlformats.org/officeDocument/2006/relationships" xmlns:p="http://schemas.openxmlformats.org/presentationml/2006/main">
-  <p:cSld>
-    <p:spTree>
-      <p:nvGrpSpPr>
-        <p:cNvPr id="1" name=""/>
-        <p:cNvGrpSpPr/>
-        <p:nvPr/>
-      </p:nvGrpSpPr>
-      <p:grpSpPr>
-        <a:xfrm>
-          <a:off x="0" y="0"/>
-          <a:ext cx="0" cy="0"/>
-          <a:chOff x="0" y="0"/>
-          <a:chExt cx="0" cy="0"/>
-        </a:xfrm>
-      </p:grpSpPr>
-      <p:pic>
-        <p:nvPicPr>
-          <p:cNvPr id="2" name="Picture 1"/>
-          <p:cNvPicPr>
-            <a:picLocks noChangeAspect="1"/>
-          </p:cNvPicPr>
-          <p:nvPr/>
-        </p:nvPicPr>
-        <p:blipFill>
-          <a:blip r:embed="rId2">
-            <a:extLst>
-              <a:ext uri="{28A0092B-C50C-407E-A947-70E740481C1C}">
-                <a14:useLocalDpi xmlns:a14="http://schemas.microsoft.com/office/drawing/2010/main" val="0"/>
-              </a:ext>
-            </a:extLst>
-          </a:blip>
-          <a:stretch>
-            <a:fillRect/>
-          </a:stretch>
-        </p:blipFill>
-        <p:spPr>
-          <a:xfrm>
-            <a:off x="134470" y="0"/>
-            <a:ext cx="8875059" cy="6858000"/>
-          </a:xfrm>
-          <a:prstGeom prst="rect">
-            <a:avLst/>
-          </a:prstGeom>
-        </p:spPr>
-      </p:pic>
-    </p:spTree>
-    <p:extLst>
-      <p:ext uri="{BB962C8B-B14F-4D97-AF65-F5344CB8AC3E}">
-        <p14:creationId xmlns:p14="http://schemas.microsoft.com/office/powerpoint/2010/main" val="1589625936"/>
       </p:ext>
     </p:extLst>
   </p:cSld>
@@ -4101,10 +4235,40 @@
           </a:prstGeom>
         </p:spPr>
       </p:pic>
+      <p:sp>
+        <p:nvSpPr>
+          <p:cNvPr id="3" name="TextBox 2"/>
+          <p:cNvSpPr txBox="1"/>
+          <p:nvPr/>
+        </p:nvSpPr>
+        <p:spPr>
+          <a:xfrm>
+            <a:off x="0" y="0"/>
+            <a:ext cx="3886200" cy="646331"/>
+          </a:xfrm>
+          <a:prstGeom prst="rect">
+            <a:avLst/>
+          </a:prstGeom>
+          <a:noFill/>
+        </p:spPr>
+        <p:txBody>
+          <a:bodyPr wrap="square" rtlCol="0">
+            <a:spAutoFit/>
+          </a:bodyPr>
+          <a:lstStyle/>
+          <a:p>
+            <a:r>
+              <a:rPr lang="en-US" dirty="0" smtClean="0"/>
+              <a:t>Note: These RMSE #s obviously need to be rounded…</a:t>
+            </a:r>
+            <a:endParaRPr lang="en-US" dirty="0"/>
+          </a:p>
+        </p:txBody>
+      </p:sp>
     </p:spTree>
     <p:extLst>
       <p:ext uri="{BB962C8B-B14F-4D97-AF65-F5344CB8AC3E}">
-        <p14:creationId xmlns:p14="http://schemas.microsoft.com/office/powerpoint/2010/main" val="3130211604"/>
+        <p14:creationId xmlns:p14="http://schemas.microsoft.com/office/powerpoint/2010/main" val="2502100759"/>
       </p:ext>
     </p:extLst>
   </p:cSld>

</xml_diff>